<commit_message>
projektterv javitasa megrendelo keresere
</commit_message>
<xml_diff>
--- a/M1_bemutato.pptx
+++ b/M1_bemutato.pptx
@@ -111,6 +111,11 @@
       </a:defRPr>
     </a:lvl9pPr>
   </p:defaultTextStyle>
+  <p:extLst>
+    <p:ext uri="{EFAFB233-063F-42B5-8137-9DF3F51BA10A}">
+      <p15:sldGuideLst xmlns:p15="http://schemas.microsoft.com/office/powerpoint/2012/main"/>
+    </p:ext>
+  </p:extLst>
 </p:presentation>
 </file>
 
@@ -1325,7 +1330,7 @@
           <a:p>
             <a:fld id="{5BFF1567-A8E5-4446-B495-9C22B560B195}" type="datetimeFigureOut">
               <a:rPr lang="en-US" smtClean="0"/>
-              <a:t>2021-10-07</a:t>
+              <a:t>2021-10-08</a:t>
             </a:fld>
             <a:endParaRPr lang="en-US"/>
           </a:p>
@@ -1563,7 +1568,7 @@
           <a:p>
             <a:fld id="{5BFF1567-A8E5-4446-B495-9C22B560B195}" type="datetimeFigureOut">
               <a:rPr lang="en-US" smtClean="0"/>
-              <a:t>2021-10-07</a:t>
+              <a:t>2021-10-08</a:t>
             </a:fld>
             <a:endParaRPr lang="en-US"/>
           </a:p>
@@ -1743,7 +1748,7 @@
           <a:p>
             <a:fld id="{5BFF1567-A8E5-4446-B495-9C22B560B195}" type="datetimeFigureOut">
               <a:rPr lang="en-US" smtClean="0"/>
-              <a:t>2021-10-07</a:t>
+              <a:t>2021-10-08</a:t>
             </a:fld>
             <a:endParaRPr lang="en-US"/>
           </a:p>
@@ -1913,7 +1918,7 @@
           <a:p>
             <a:fld id="{5BFF1567-A8E5-4446-B495-9C22B560B195}" type="datetimeFigureOut">
               <a:rPr lang="en-US" smtClean="0"/>
-              <a:t>2021-10-07</a:t>
+              <a:t>2021-10-08</a:t>
             </a:fld>
             <a:endParaRPr lang="en-US"/>
           </a:p>
@@ -2189,7 +2194,7 @@
           <a:p>
             <a:fld id="{5BFF1567-A8E5-4446-B495-9C22B560B195}" type="datetimeFigureOut">
               <a:rPr lang="en-US" smtClean="0"/>
-              <a:t>2021-10-07</a:t>
+              <a:t>2021-10-08</a:t>
             </a:fld>
             <a:endParaRPr lang="en-US"/>
           </a:p>
@@ -3390,7 +3395,7 @@
           <a:p>
             <a:fld id="{5BFF1567-A8E5-4446-B495-9C22B560B195}" type="datetimeFigureOut">
               <a:rPr lang="en-US" smtClean="0"/>
-              <a:t>2021-10-07</a:t>
+              <a:t>2021-10-08</a:t>
             </a:fld>
             <a:endParaRPr lang="en-US"/>
           </a:p>
@@ -3780,7 +3785,7 @@
           <a:p>
             <a:fld id="{5BFF1567-A8E5-4446-B495-9C22B560B195}" type="datetimeFigureOut">
               <a:rPr lang="en-US" smtClean="0"/>
-              <a:t>2021-10-07</a:t>
+              <a:t>2021-10-08</a:t>
             </a:fld>
             <a:endParaRPr lang="en-US"/>
           </a:p>
@@ -3903,7 +3908,7 @@
           <a:p>
             <a:fld id="{5BFF1567-A8E5-4446-B495-9C22B560B195}" type="datetimeFigureOut">
               <a:rPr lang="en-US" smtClean="0"/>
-              <a:t>2021-10-07</a:t>
+              <a:t>2021-10-08</a:t>
             </a:fld>
             <a:endParaRPr lang="en-US"/>
           </a:p>
@@ -3998,7 +4003,7 @@
           <a:p>
             <a:fld id="{5BFF1567-A8E5-4446-B495-9C22B560B195}" type="datetimeFigureOut">
               <a:rPr lang="en-US" smtClean="0"/>
-              <a:t>2021-10-07</a:t>
+              <a:t>2021-10-08</a:t>
             </a:fld>
             <a:endParaRPr lang="en-US"/>
           </a:p>
@@ -4761,7 +4766,7 @@
           <a:p>
             <a:fld id="{5BFF1567-A8E5-4446-B495-9C22B560B195}" type="datetimeFigureOut">
               <a:rPr lang="en-US" smtClean="0"/>
-              <a:t>2021-10-07</a:t>
+              <a:t>2021-10-08</a:t>
             </a:fld>
             <a:endParaRPr lang="en-US"/>
           </a:p>
@@ -5601,7 +5606,7 @@
           <a:p>
             <a:fld id="{5BFF1567-A8E5-4446-B495-9C22B560B195}" type="datetimeFigureOut">
               <a:rPr lang="en-US" smtClean="0"/>
-              <a:t>2021-10-07</a:t>
+              <a:t>2021-10-08</a:t>
             </a:fld>
             <a:endParaRPr lang="en-US"/>
           </a:p>
@@ -5828,7 +5833,7 @@
           <a:p>
             <a:fld id="{5BFF1567-A8E5-4446-B495-9C22B560B195}" type="datetimeFigureOut">
               <a:rPr lang="en-US" smtClean="0"/>
-              <a:t>2021-10-07</a:t>
+              <a:t>2021-10-08</a:t>
             </a:fld>
             <a:endParaRPr lang="en-US"/>
           </a:p>
@@ -7877,7 +7882,7 @@
           <a:p>
             <a:r>
               <a:rPr lang="en-US"/>
-              <a:t>Köszi heló</a:t>
+              <a:t>KöszÖNJÜK!</a:t>
             </a:r>
           </a:p>
         </p:txBody>

</xml_diff>

<commit_message>
ppt modositasa gantt d. miatt
</commit_message>
<xml_diff>
--- a/M1_bemutato.pptx
+++ b/M1_bemutato.pptx
@@ -1330,7 +1330,7 @@
           <a:p>
             <a:fld id="{5BFF1567-A8E5-4446-B495-9C22B560B195}" type="datetimeFigureOut">
               <a:rPr lang="en-US" smtClean="0"/>
-              <a:t>2021-10-08</a:t>
+              <a:t>2021-10-09</a:t>
             </a:fld>
             <a:endParaRPr lang="en-US"/>
           </a:p>
@@ -1568,7 +1568,7 @@
           <a:p>
             <a:fld id="{5BFF1567-A8E5-4446-B495-9C22B560B195}" type="datetimeFigureOut">
               <a:rPr lang="en-US" smtClean="0"/>
-              <a:t>2021-10-08</a:t>
+              <a:t>2021-10-09</a:t>
             </a:fld>
             <a:endParaRPr lang="en-US"/>
           </a:p>
@@ -1748,7 +1748,7 @@
           <a:p>
             <a:fld id="{5BFF1567-A8E5-4446-B495-9C22B560B195}" type="datetimeFigureOut">
               <a:rPr lang="en-US" smtClean="0"/>
-              <a:t>2021-10-08</a:t>
+              <a:t>2021-10-09</a:t>
             </a:fld>
             <a:endParaRPr lang="en-US"/>
           </a:p>
@@ -1918,7 +1918,7 @@
           <a:p>
             <a:fld id="{5BFF1567-A8E5-4446-B495-9C22B560B195}" type="datetimeFigureOut">
               <a:rPr lang="en-US" smtClean="0"/>
-              <a:t>2021-10-08</a:t>
+              <a:t>2021-10-09</a:t>
             </a:fld>
             <a:endParaRPr lang="en-US"/>
           </a:p>
@@ -2194,7 +2194,7 @@
           <a:p>
             <a:fld id="{5BFF1567-A8E5-4446-B495-9C22B560B195}" type="datetimeFigureOut">
               <a:rPr lang="en-US" smtClean="0"/>
-              <a:t>2021-10-08</a:t>
+              <a:t>2021-10-09</a:t>
             </a:fld>
             <a:endParaRPr lang="en-US"/>
           </a:p>
@@ -3395,7 +3395,7 @@
           <a:p>
             <a:fld id="{5BFF1567-A8E5-4446-B495-9C22B560B195}" type="datetimeFigureOut">
               <a:rPr lang="en-US" smtClean="0"/>
-              <a:t>2021-10-08</a:t>
+              <a:t>2021-10-09</a:t>
             </a:fld>
             <a:endParaRPr lang="en-US"/>
           </a:p>
@@ -3785,7 +3785,7 @@
           <a:p>
             <a:fld id="{5BFF1567-A8E5-4446-B495-9C22B560B195}" type="datetimeFigureOut">
               <a:rPr lang="en-US" smtClean="0"/>
-              <a:t>2021-10-08</a:t>
+              <a:t>2021-10-09</a:t>
             </a:fld>
             <a:endParaRPr lang="en-US"/>
           </a:p>
@@ -3908,7 +3908,7 @@
           <a:p>
             <a:fld id="{5BFF1567-A8E5-4446-B495-9C22B560B195}" type="datetimeFigureOut">
               <a:rPr lang="en-US" smtClean="0"/>
-              <a:t>2021-10-08</a:t>
+              <a:t>2021-10-09</a:t>
             </a:fld>
             <a:endParaRPr lang="en-US"/>
           </a:p>
@@ -4003,7 +4003,7 @@
           <a:p>
             <a:fld id="{5BFF1567-A8E5-4446-B495-9C22B560B195}" type="datetimeFigureOut">
               <a:rPr lang="en-US" smtClean="0"/>
-              <a:t>2021-10-08</a:t>
+              <a:t>2021-10-09</a:t>
             </a:fld>
             <a:endParaRPr lang="en-US"/>
           </a:p>
@@ -4766,7 +4766,7 @@
           <a:p>
             <a:fld id="{5BFF1567-A8E5-4446-B495-9C22B560B195}" type="datetimeFigureOut">
               <a:rPr lang="en-US" smtClean="0"/>
-              <a:t>2021-10-08</a:t>
+              <a:t>2021-10-09</a:t>
             </a:fld>
             <a:endParaRPr lang="en-US"/>
           </a:p>
@@ -5606,7 +5606,7 @@
           <a:p>
             <a:fld id="{5BFF1567-A8E5-4446-B495-9C22B560B195}" type="datetimeFigureOut">
               <a:rPr lang="en-US" smtClean="0"/>
-              <a:t>2021-10-08</a:t>
+              <a:t>2021-10-09</a:t>
             </a:fld>
             <a:endParaRPr lang="en-US"/>
           </a:p>
@@ -5833,7 +5833,7 @@
           <a:p>
             <a:fld id="{5BFF1567-A8E5-4446-B495-9C22B560B195}" type="datetimeFigureOut">
               <a:rPr lang="en-US" smtClean="0"/>
-              <a:t>2021-10-08</a:t>
+              <a:t>2021-10-09</a:t>
             </a:fld>
             <a:endParaRPr lang="en-US"/>
           </a:p>
@@ -7552,7 +7552,7 @@
             </a:pPr>
             <a:r>
               <a:rPr lang="en-US"/>
-              <a:t>A projekt kb. 12 személynap/fő erősforrásigény</a:t>
+              <a:t>A projekt kb. 13 személynap/fő erősforrásigény</a:t>
             </a:r>
             <a:r>
               <a:rPr lang="hu-HU"/>
@@ -7567,25 +7567,19 @@
             <a:pPr marL="0" indent="0">
               <a:buNone/>
             </a:pPr>
-            <a:endParaRPr lang="en-US"/>
-          </a:p>
-          <a:p>
-            <a:pPr marL="0" indent="0">
-              <a:buNone/>
-            </a:pPr>
             <a:r>
               <a:rPr lang="en-US"/>
-              <a:t>A költségvetésünk: </a:t>
+              <a:t> </a:t>
             </a:r>
           </a:p>
         </p:txBody>
       </p:sp>
       <p:pic>
         <p:nvPicPr>
-          <p:cNvPr id="4" name="Kép 3">
+          <p:cNvPr id="5" name="Kép 4">
             <a:extLst>
               <a:ext uri="{FF2B5EF4-FFF2-40B4-BE49-F238E27FC236}">
-                <a16:creationId xmlns:a16="http://schemas.microsoft.com/office/drawing/2014/main" id="{1CD4405F-15A3-4317-B9D4-BF8B2538C2BA}"/>
+                <a16:creationId xmlns:a16="http://schemas.microsoft.com/office/drawing/2014/main" id="{61B054DC-3EBE-4A3C-A7DC-5E7610F96F48}"/>
               </a:ext>
             </a:extLst>
           </p:cNvPr>
@@ -7602,8 +7596,8 @@
         </p:blipFill>
         <p:spPr>
           <a:xfrm>
-            <a:off x="0" y="3627220"/>
-            <a:ext cx="12192000" cy="2712528"/>
+            <a:off x="0" y="3134374"/>
+            <a:ext cx="12192000" cy="2745218"/>
           </a:xfrm>
           <a:prstGeom prst="rect">
             <a:avLst/>
@@ -7670,10 +7664,10 @@
       </p:sp>
       <p:pic>
         <p:nvPicPr>
-          <p:cNvPr id="5" name="Tartalom helye 4">
+          <p:cNvPr id="7" name="Tartalom helye 6">
             <a:extLst>
               <a:ext uri="{FF2B5EF4-FFF2-40B4-BE49-F238E27FC236}">
-                <a16:creationId xmlns:a16="http://schemas.microsoft.com/office/drawing/2014/main" id="{07BD7BA2-A7CA-436D-9BCF-072B54B6AF29}"/>
+                <a16:creationId xmlns:a16="http://schemas.microsoft.com/office/drawing/2014/main" id="{D77AC6FC-F063-4228-AEBF-0191D0DFCCFF}"/>
               </a:ext>
             </a:extLst>
           </p:cNvPr>
@@ -7698,8 +7692,8 @@
         </p:blipFill>
         <p:spPr>
           <a:xfrm>
-            <a:off x="0" y="1874517"/>
-            <a:ext cx="12192000" cy="3745311"/>
+            <a:off x="0" y="2775057"/>
+            <a:ext cx="12192001" cy="4082943"/>
           </a:xfrm>
         </p:spPr>
       </p:pic>
@@ -7768,44 +7762,21 @@
           </a:p>
         </p:txBody>
       </p:sp>
-      <p:sp>
-        <p:nvSpPr>
-          <p:cNvPr id="6" name="Tartalom helye 5">
+      <p:pic>
+        <p:nvPicPr>
+          <p:cNvPr id="4" name="Tartalom helye 3">
             <a:extLst>
               <a:ext uri="{FF2B5EF4-FFF2-40B4-BE49-F238E27FC236}">
-                <a16:creationId xmlns:a16="http://schemas.microsoft.com/office/drawing/2014/main" id="{BF5033DE-D611-4A95-884C-BB6A657090A9}"/>
-              </a:ext>
-            </a:extLst>
-          </p:cNvPr>
-          <p:cNvSpPr>
-            <a:spLocks noGrp="1"/>
-          </p:cNvSpPr>
-          <p:nvPr>
-            <p:ph idx="1"/>
-          </p:nvPr>
-        </p:nvSpPr>
-        <p:spPr/>
-        <p:txBody>
-          <a:bodyPr/>
-          <a:lstStyle/>
-          <a:p>
-            <a:endParaRPr lang="en-US"/>
-          </a:p>
-        </p:txBody>
-      </p:sp>
-      <p:pic>
-        <p:nvPicPr>
-          <p:cNvPr id="7" name="Tartalom helye 4">
-            <a:extLst>
-              <a:ext uri="{FF2B5EF4-FFF2-40B4-BE49-F238E27FC236}">
-                <a16:creationId xmlns:a16="http://schemas.microsoft.com/office/drawing/2014/main" id="{75847B3B-F08E-4F98-93C9-5F1C20E534BF}"/>
+                <a16:creationId xmlns:a16="http://schemas.microsoft.com/office/drawing/2014/main" id="{CE627174-CCD3-40AC-B2BE-2EA9684A929A}"/>
               </a:ext>
             </a:extLst>
           </p:cNvPr>
           <p:cNvPicPr>
-            <a:picLocks noChangeAspect="1"/>
+            <a:picLocks noGrp="1" noChangeAspect="1"/>
           </p:cNvPicPr>
-          <p:nvPr/>
+          <p:nvPr>
+            <p:ph idx="1"/>
+          </p:nvPr>
         </p:nvPicPr>
         <p:blipFill>
           <a:blip r:embed="rId2">
@@ -7821,12 +7792,9 @@
         </p:blipFill>
         <p:spPr>
           <a:xfrm>
-            <a:off x="0" y="1703614"/>
-            <a:ext cx="12190659" cy="4430486"/>
+            <a:off x="0" y="2059506"/>
+            <a:ext cx="12192000" cy="4798494"/>
           </a:xfrm>
-          <a:prstGeom prst="rect">
-            <a:avLst/>
-          </a:prstGeom>
         </p:spPr>
       </p:pic>
     </p:spTree>
@@ -7882,7 +7850,7 @@
           <a:p>
             <a:r>
               <a:rPr lang="en-US"/>
-              <a:t>KöszÖNJÜK!</a:t>
+              <a:t>KöszÖNJÜK a figyelmet</a:t>
             </a:r>
           </a:p>
         </p:txBody>

</xml_diff>